<commit_message>
Update job functions assignment
</commit_message>
<xml_diff>
--- a/Presentation/Presentation - Solution Approach.pptx
+++ b/Presentation/Presentation - Solution Approach.pptx
@@ -5,10 +5,9 @@
     <p:sldMasterId id="2147483648" r:id="rId1"/>
   </p:sldMasterIdLst>
   <p:sldIdLst>
-    <p:sldId id="256" r:id="rId2"/>
-    <p:sldId id="257" r:id="rId3"/>
-    <p:sldId id="259" r:id="rId4"/>
-    <p:sldId id="258" r:id="rId5"/>
+    <p:sldId id="257" r:id="rId2"/>
+    <p:sldId id="259" r:id="rId3"/>
+    <p:sldId id="258" r:id="rId4"/>
   </p:sldIdLst>
   <p:sldSz cx="12192000" cy="6858000"/>
   <p:notesSz cx="6858000" cy="9144000"/>
@@ -3350,86 +3349,6 @@
           <p:cNvPr id="2" name="Title 1">
             <a:extLst>
               <a:ext uri="{FF2B5EF4-FFF2-40B4-BE49-F238E27FC236}">
-                <a16:creationId xmlns:a16="http://schemas.microsoft.com/office/drawing/2014/main" id="{94DE27B0-A533-6550-6046-B82C97D1DA67}"/>
-              </a:ext>
-            </a:extLst>
-          </p:cNvPr>
-          <p:cNvSpPr>
-            <a:spLocks noGrp="1"/>
-          </p:cNvSpPr>
-          <p:nvPr>
-            <p:ph type="ctrTitle"/>
-          </p:nvPr>
-        </p:nvSpPr>
-        <p:spPr/>
-        <p:txBody>
-          <a:bodyPr/>
-          <a:lstStyle/>
-          <a:p>
-            <a:endParaRPr lang="en-TH" dirty="0"/>
-          </a:p>
-        </p:txBody>
-      </p:sp>
-      <p:sp>
-        <p:nvSpPr>
-          <p:cNvPr id="3" name="Subtitle 2">
-            <a:extLst>
-              <a:ext uri="{FF2B5EF4-FFF2-40B4-BE49-F238E27FC236}">
-                <a16:creationId xmlns:a16="http://schemas.microsoft.com/office/drawing/2014/main" id="{0D68E100-DA7C-6FA9-C96E-8D5D0244C25E}"/>
-              </a:ext>
-            </a:extLst>
-          </p:cNvPr>
-          <p:cNvSpPr>
-            <a:spLocks noGrp="1"/>
-          </p:cNvSpPr>
-          <p:nvPr>
-            <p:ph type="subTitle" idx="1"/>
-          </p:nvPr>
-        </p:nvSpPr>
-        <p:spPr/>
-        <p:txBody>
-          <a:bodyPr/>
-          <a:lstStyle/>
-          <a:p>
-            <a:endParaRPr lang="en-TH"/>
-          </a:p>
-        </p:txBody>
-      </p:sp>
-    </p:spTree>
-    <p:extLst>
-      <p:ext uri="{BB962C8B-B14F-4D97-AF65-F5344CB8AC3E}">
-        <p14:creationId xmlns:p14="http://schemas.microsoft.com/office/powerpoint/2010/main" val="2691482220"/>
-      </p:ext>
-    </p:extLst>
-  </p:cSld>
-  <p:clrMapOvr>
-    <a:masterClrMapping/>
-  </p:clrMapOvr>
-</p:sld>
-</file>
-
-<file path=ppt/slides/slide2.xml><?xml version="1.0" encoding="utf-8"?>
-<p:sld xmlns:a="http://schemas.openxmlformats.org/drawingml/2006/main" xmlns:r="http://schemas.openxmlformats.org/officeDocument/2006/relationships" xmlns:p="http://schemas.openxmlformats.org/presentationml/2006/main">
-  <p:cSld>
-    <p:spTree>
-      <p:nvGrpSpPr>
-        <p:cNvPr id="1" name=""/>
-        <p:cNvGrpSpPr/>
-        <p:nvPr/>
-      </p:nvGrpSpPr>
-      <p:grpSpPr>
-        <a:xfrm>
-          <a:off x="0" y="0"/>
-          <a:ext cx="0" cy="0"/>
-          <a:chOff x="0" y="0"/>
-          <a:chExt cx="0" cy="0"/>
-        </a:xfrm>
-      </p:grpSpPr>
-      <p:sp>
-        <p:nvSpPr>
-          <p:cNvPr id="2" name="Title 1">
-            <a:extLst>
-              <a:ext uri="{FF2B5EF4-FFF2-40B4-BE49-F238E27FC236}">
                 <a16:creationId xmlns:a16="http://schemas.microsoft.com/office/drawing/2014/main" id="{C5AF2601-5832-5712-F88A-46EFB5C2F7F5}"/>
               </a:ext>
             </a:extLst>
@@ -3503,7 +3422,7 @@
 </p:sld>
 </file>
 
-<file path=ppt/slides/slide3.xml><?xml version="1.0" encoding="utf-8"?>
+<file path=ppt/slides/slide2.xml><?xml version="1.0" encoding="utf-8"?>
 <p:sld xmlns:a="http://schemas.openxmlformats.org/drawingml/2006/main" xmlns:r="http://schemas.openxmlformats.org/officeDocument/2006/relationships" xmlns:p="http://schemas.openxmlformats.org/presentationml/2006/main">
   <p:cSld>
     <p:spTree>
@@ -3648,7 +3567,7 @@
         </p:nvSpPr>
         <p:spPr>
           <a:xfrm>
-            <a:off x="9362461" y="4977603"/>
+            <a:off x="9399036" y="4869683"/>
             <a:ext cx="959006" cy="829298"/>
           </a:xfrm>
           <a:prstGeom prst="rect">
@@ -4097,7 +4016,7 @@
 </p:sld>
 </file>
 
-<file path=ppt/slides/slide4.xml><?xml version="1.0" encoding="utf-8"?>
+<file path=ppt/slides/slide3.xml><?xml version="1.0" encoding="utf-8"?>
 <p:sld xmlns:a="http://schemas.openxmlformats.org/drawingml/2006/main" xmlns:r="http://schemas.openxmlformats.org/officeDocument/2006/relationships" xmlns:p="http://schemas.openxmlformats.org/presentationml/2006/main">
   <p:cSld>
     <p:spTree>
@@ -4242,8 +4161,8 @@
         </p:nvSpPr>
         <p:spPr>
           <a:xfrm>
-            <a:off x="9266662" y="3197159"/>
-            <a:ext cx="1282389" cy="1261686"/>
+            <a:off x="9179170" y="3197158"/>
+            <a:ext cx="1159723" cy="1431153"/>
           </a:xfrm>
           <a:prstGeom prst="rect">
             <a:avLst/>
@@ -4545,8 +4464,8 @@
         </p:nvSpPr>
         <p:spPr>
           <a:xfrm>
-            <a:off x="6291355" y="4562825"/>
-            <a:ext cx="2682348" cy="383503"/>
+            <a:off x="6291355" y="4423109"/>
+            <a:ext cx="2554991" cy="523220"/>
           </a:xfrm>
           <a:prstGeom prst="rect">
             <a:avLst/>
@@ -4576,6 +4495,55 @@
             <a:r>
               <a:rPr lang="en-TH" dirty="0"/>
               <a:t>Conference rooms</a:t>
+            </a:r>
+          </a:p>
+        </p:txBody>
+      </p:sp>
+      <p:sp>
+        <p:nvSpPr>
+          <p:cNvPr id="12" name="Rectangle 11">
+            <a:extLst>
+              <a:ext uri="{FF2B5EF4-FFF2-40B4-BE49-F238E27FC236}">
+                <a16:creationId xmlns:a16="http://schemas.microsoft.com/office/drawing/2014/main" id="{4003B764-489F-FB8F-280A-995EC80EE6FC}"/>
+              </a:ext>
+            </a:extLst>
+          </p:cNvPr>
+          <p:cNvSpPr/>
+          <p:nvPr/>
+        </p:nvSpPr>
+        <p:spPr>
+          <a:xfrm>
+            <a:off x="8973703" y="4999201"/>
+            <a:ext cx="1282389" cy="754827"/>
+          </a:xfrm>
+          <a:prstGeom prst="rect">
+            <a:avLst/>
+          </a:prstGeom>
+        </p:spPr>
+        <p:style>
+          <a:lnRef idx="2">
+            <a:schemeClr val="accent1">
+              <a:shade val="50000"/>
+            </a:schemeClr>
+          </a:lnRef>
+          <a:fillRef idx="1">
+            <a:schemeClr val="accent1"/>
+          </a:fillRef>
+          <a:effectRef idx="0">
+            <a:schemeClr val="accent1"/>
+          </a:effectRef>
+          <a:fontRef idx="minor">
+            <a:schemeClr val="lt1"/>
+          </a:fontRef>
+        </p:style>
+        <p:txBody>
+          <a:bodyPr rtlCol="0" anchor="ctr"/>
+          <a:lstStyle/>
+          <a:p>
+            <a:pPr algn="ctr"/>
+            <a:r>
+              <a:rPr lang="en-TH" dirty="0"/>
+              <a:t>Trainning center</a:t>
             </a:r>
           </a:p>
         </p:txBody>

</xml_diff>